<commit_message>
Changed 'Purely Experimental' to 'Exploratory'; added 'Unspecified Maturity' classification; removed 'stable' postfix from Production phases.
Changing from 'Purely Experimental' to 'Exploratory' was Carter Edward's idea and I like it.

I added 'Unspecified Maturity' as a possible classification to allow packages to opt out of the whole lifecycle model.
</commit_message>
<xml_diff>
--- a/doc/TrilinosLifecycleModel2/ImprovementsInDevelopmentPhases.pptx
+++ b/doc/TrilinosLifecycleModel2/ImprovementsInDevelopmentPhases.pptx
@@ -288,7 +288,7 @@
           <a:p>
             <a:fld id="{DAAF2A7E-F183-4AEC-8AD4-F1D906E932CB}" type="datetimeFigureOut">
               <a:rPr lang="en-US" smtClean="0"/>
-              <a:t>10/27/2011</a:t>
+              <a:t>11/4/2011</a:t>
             </a:fld>
             <a:endParaRPr lang="en-US"/>
           </a:p>
@@ -458,7 +458,7 @@
           <a:p>
             <a:fld id="{DAAF2A7E-F183-4AEC-8AD4-F1D906E932CB}" type="datetimeFigureOut">
               <a:rPr lang="en-US" smtClean="0"/>
-              <a:t>10/27/2011</a:t>
+              <a:t>11/4/2011</a:t>
             </a:fld>
             <a:endParaRPr lang="en-US"/>
           </a:p>
@@ -638,7 +638,7 @@
           <a:p>
             <a:fld id="{DAAF2A7E-F183-4AEC-8AD4-F1D906E932CB}" type="datetimeFigureOut">
               <a:rPr lang="en-US" smtClean="0"/>
-              <a:t>10/27/2011</a:t>
+              <a:t>11/4/2011</a:t>
             </a:fld>
             <a:endParaRPr lang="en-US"/>
           </a:p>
@@ -808,7 +808,7 @@
           <a:p>
             <a:fld id="{DAAF2A7E-F183-4AEC-8AD4-F1D906E932CB}" type="datetimeFigureOut">
               <a:rPr lang="en-US" smtClean="0"/>
-              <a:t>10/27/2011</a:t>
+              <a:t>11/4/2011</a:t>
             </a:fld>
             <a:endParaRPr lang="en-US"/>
           </a:p>
@@ -1054,7 +1054,7 @@
           <a:p>
             <a:fld id="{DAAF2A7E-F183-4AEC-8AD4-F1D906E932CB}" type="datetimeFigureOut">
               <a:rPr lang="en-US" smtClean="0"/>
-              <a:t>10/27/2011</a:t>
+              <a:t>11/4/2011</a:t>
             </a:fld>
             <a:endParaRPr lang="en-US"/>
           </a:p>
@@ -1342,7 +1342,7 @@
           <a:p>
             <a:fld id="{DAAF2A7E-F183-4AEC-8AD4-F1D906E932CB}" type="datetimeFigureOut">
               <a:rPr lang="en-US" smtClean="0"/>
-              <a:t>10/27/2011</a:t>
+              <a:t>11/4/2011</a:t>
             </a:fld>
             <a:endParaRPr lang="en-US"/>
           </a:p>
@@ -1764,7 +1764,7 @@
           <a:p>
             <a:fld id="{DAAF2A7E-F183-4AEC-8AD4-F1D906E932CB}" type="datetimeFigureOut">
               <a:rPr lang="en-US" smtClean="0"/>
-              <a:t>10/27/2011</a:t>
+              <a:t>11/4/2011</a:t>
             </a:fld>
             <a:endParaRPr lang="en-US"/>
           </a:p>
@@ -1882,7 +1882,7 @@
           <a:p>
             <a:fld id="{DAAF2A7E-F183-4AEC-8AD4-F1D906E932CB}" type="datetimeFigureOut">
               <a:rPr lang="en-US" smtClean="0"/>
-              <a:t>10/27/2011</a:t>
+              <a:t>11/4/2011</a:t>
             </a:fld>
             <a:endParaRPr lang="en-US"/>
           </a:p>
@@ -1977,7 +1977,7 @@
           <a:p>
             <a:fld id="{DAAF2A7E-F183-4AEC-8AD4-F1D906E932CB}" type="datetimeFigureOut">
               <a:rPr lang="en-US" smtClean="0"/>
-              <a:t>10/27/2011</a:t>
+              <a:t>11/4/2011</a:t>
             </a:fld>
             <a:endParaRPr lang="en-US"/>
           </a:p>
@@ -2254,7 +2254,7 @@
           <a:p>
             <a:fld id="{DAAF2A7E-F183-4AEC-8AD4-F1D906E932CB}" type="datetimeFigureOut">
               <a:rPr lang="en-US" smtClean="0"/>
-              <a:t>10/27/2011</a:t>
+              <a:t>11/4/2011</a:t>
             </a:fld>
             <a:endParaRPr lang="en-US"/>
           </a:p>
@@ -2507,7 +2507,7 @@
           <a:p>
             <a:fld id="{DAAF2A7E-F183-4AEC-8AD4-F1D906E932CB}" type="datetimeFigureOut">
               <a:rPr lang="en-US" smtClean="0"/>
-              <a:t>10/27/2011</a:t>
+              <a:t>11/4/2011</a:t>
             </a:fld>
             <a:endParaRPr lang="en-US"/>
           </a:p>
@@ -2720,7 +2720,7 @@
           <a:p>
             <a:fld id="{DAAF2A7E-F183-4AEC-8AD4-F1D906E932CB}" type="datetimeFigureOut">
               <a:rPr lang="en-US" smtClean="0"/>
-              <a:t>10/27/2011</a:t>
+              <a:t>11/4/2011</a:t>
             </a:fld>
             <a:endParaRPr lang="en-US"/>
           </a:p>
@@ -3314,10 +3314,6 @@
           </a:p>
           <a:p>
             <a:pPr algn="ctr"/>
-            <a:r>
-              <a:rPr lang="en-US" sz="1000" dirty="0" smtClean="0"/>
-              <a:t>Stable</a:t>
-            </a:r>
             <a:endParaRPr lang="en-US" sz="1000" dirty="0"/>
           </a:p>
         </p:txBody>
@@ -3359,10 +3355,6 @@
           </a:p>
           <a:p>
             <a:pPr algn="ctr"/>
-            <a:r>
-              <a:rPr lang="en-US" sz="1000" dirty="0" smtClean="0"/>
-              <a:t>Stable</a:t>
-            </a:r>
             <a:endParaRPr lang="en-US" sz="1000" dirty="0"/>
           </a:p>
         </p:txBody>
@@ -3741,10 +3733,6 @@
           </a:p>
           <a:p>
             <a:pPr algn="ctr"/>
-            <a:r>
-              <a:rPr lang="en-US" sz="1000" dirty="0" smtClean="0"/>
-              <a:t>Stable</a:t>
-            </a:r>
             <a:endParaRPr lang="en-US" sz="1000" dirty="0"/>
           </a:p>
         </p:txBody>
@@ -3786,10 +3774,6 @@
           </a:p>
           <a:p>
             <a:pPr algn="ctr"/>
-            <a:r>
-              <a:rPr lang="en-US" sz="1000" dirty="0" smtClean="0"/>
-              <a:t>Stable</a:t>
-            </a:r>
             <a:endParaRPr lang="en-US" sz="1000" dirty="0"/>
           </a:p>
         </p:txBody>
@@ -4044,10 +4028,6 @@
           </a:p>
           <a:p>
             <a:pPr algn="ctr"/>
-            <a:r>
-              <a:rPr lang="en-US" sz="1000" dirty="0" smtClean="0"/>
-              <a:t>Stable</a:t>
-            </a:r>
             <a:endParaRPr lang="en-US" sz="1000" dirty="0"/>
           </a:p>
         </p:txBody>
@@ -4089,10 +4069,6 @@
           </a:p>
           <a:p>
             <a:pPr algn="ctr"/>
-            <a:r>
-              <a:rPr lang="en-US" sz="1000" dirty="0" smtClean="0"/>
-              <a:t>Stable</a:t>
-            </a:r>
             <a:endParaRPr lang="en-US" sz="1000" dirty="0"/>
           </a:p>
         </p:txBody>
@@ -4447,10 +4423,6 @@
           </a:p>
           <a:p>
             <a:pPr algn="ctr"/>
-            <a:r>
-              <a:rPr lang="en-US" sz="1000" dirty="0" smtClean="0"/>
-              <a:t>Stable</a:t>
-            </a:r>
             <a:endParaRPr lang="en-US" sz="1000" dirty="0"/>
           </a:p>
         </p:txBody>
@@ -4492,10 +4464,6 @@
           </a:p>
           <a:p>
             <a:pPr algn="ctr"/>
-            <a:r>
-              <a:rPr lang="en-US" sz="1000" dirty="0" smtClean="0"/>
-              <a:t>Stable</a:t>
-            </a:r>
             <a:endParaRPr lang="en-US" sz="1000" dirty="0"/>
           </a:p>
         </p:txBody>
@@ -4750,10 +4718,6 @@
           </a:p>
           <a:p>
             <a:pPr algn="ctr"/>
-            <a:r>
-              <a:rPr lang="en-US" sz="1000" dirty="0" smtClean="0"/>
-              <a:t>Stable</a:t>
-            </a:r>
             <a:endParaRPr lang="en-US" sz="1000" dirty="0"/>
           </a:p>
         </p:txBody>
@@ -4795,10 +4759,6 @@
           </a:p>
           <a:p>
             <a:pPr algn="ctr"/>
-            <a:r>
-              <a:rPr lang="en-US" sz="1000" dirty="0" smtClean="0"/>
-              <a:t>Stable</a:t>
-            </a:r>
             <a:endParaRPr lang="en-US" sz="1000" dirty="0"/>
           </a:p>
         </p:txBody>
@@ -5202,10 +5162,6 @@
           </a:p>
           <a:p>
             <a:pPr algn="ctr"/>
-            <a:r>
-              <a:rPr lang="en-US" sz="1000" dirty="0" smtClean="0"/>
-              <a:t>Stable</a:t>
-            </a:r>
             <a:endParaRPr lang="en-US" sz="1000" dirty="0"/>
           </a:p>
         </p:txBody>
@@ -5247,10 +5203,6 @@
           </a:p>
           <a:p>
             <a:pPr algn="ctr"/>
-            <a:r>
-              <a:rPr lang="en-US" sz="1000" dirty="0" smtClean="0"/>
-              <a:t>Stable</a:t>
-            </a:r>
             <a:endParaRPr lang="en-US" sz="1000" dirty="0"/>
           </a:p>
         </p:txBody>
@@ -6011,10 +5963,6 @@
           </a:p>
           <a:p>
             <a:pPr algn="ctr"/>
-            <a:r>
-              <a:rPr lang="en-US" sz="1000" dirty="0" smtClean="0"/>
-              <a:t>Stable</a:t>
-            </a:r>
             <a:endParaRPr lang="en-US" sz="1000" dirty="0"/>
           </a:p>
         </p:txBody>
@@ -6056,10 +6004,6 @@
           </a:p>
           <a:p>
             <a:pPr algn="ctr"/>
-            <a:r>
-              <a:rPr lang="en-US" sz="1000" dirty="0" smtClean="0"/>
-              <a:t>Stable</a:t>
-            </a:r>
             <a:endParaRPr lang="en-US" sz="1000" dirty="0"/>
           </a:p>
         </p:txBody>
@@ -6314,10 +6258,6 @@
           </a:p>
           <a:p>
             <a:pPr algn="ctr"/>
-            <a:r>
-              <a:rPr lang="en-US" sz="1000" dirty="0" smtClean="0"/>
-              <a:t>Stable</a:t>
-            </a:r>
             <a:endParaRPr lang="en-US" sz="1000" dirty="0"/>
           </a:p>
         </p:txBody>
@@ -6359,10 +6299,6 @@
           </a:p>
           <a:p>
             <a:pPr algn="ctr"/>
-            <a:r>
-              <a:rPr lang="en-US" sz="1000" dirty="0" smtClean="0"/>
-              <a:t>Stable</a:t>
-            </a:r>
             <a:endParaRPr lang="en-US" sz="1000" dirty="0"/>
           </a:p>
         </p:txBody>

</xml_diff>